<commit_message>
finish presentation; start one-page
</commit_message>
<xml_diff>
--- a/teamProj/slides.pptx
+++ b/teamProj/slides.pptx
@@ -5,7 +5,7 @@
     <p:sldMasterId id="2147483648" r:id="rId1"/>
   </p:sldMasterIdLst>
   <p:notesMasterIdLst>
-    <p:notesMasterId r:id="rId26"/>
+    <p:notesMasterId r:id="rId27"/>
   </p:notesMasterIdLst>
   <p:sldIdLst>
     <p:sldId id="256" r:id="rId2"/>
@@ -32,6 +32,7 @@
     <p:sldId id="278" r:id="rId23"/>
     <p:sldId id="281" r:id="rId24"/>
     <p:sldId id="282" r:id="rId25"/>
+    <p:sldId id="283" r:id="rId26"/>
   </p:sldIdLst>
   <p:sldSz cx="9144000" cy="6858000" type="screen4x3"/>
   <p:notesSz cx="6858000" cy="9144000"/>
@@ -215,7 +216,7 @@
           <a:p>
             <a:fld id="{75862928-B471-4252-8FDB-190DFBD60404}" type="datetimeFigureOut">
               <a:rPr lang="en-US" smtClean="0"/>
-              <a:t>4/21/2018</a:t>
+              <a:t>4/24/2018</a:t>
             </a:fld>
             <a:endParaRPr lang="en-US"/>
           </a:p>
@@ -778,7 +779,6 @@
               <a:rPr lang="en-US" baseline="0" dirty="0" smtClean="0"/>
               <a:t>- Note the absence of strings</a:t>
             </a:r>
-            <a:endParaRPr lang="en-US" baseline="0" dirty="0" smtClean="0"/>
           </a:p>
         </p:txBody>
       </p:sp>
@@ -1846,6 +1846,94 @@
             <a:fld id="{48F5F6DF-9BE4-4641-AC70-C633D8EF56D7}" type="slidenum">
               <a:rPr lang="en-US" smtClean="0"/>
               <a:t>24</a:t>
+            </a:fld>
+            <a:endParaRPr lang="en-US"/>
+          </a:p>
+        </p:txBody>
+      </p:sp>
+    </p:spTree>
+    <p:extLst>
+      <p:ext uri="{BB962C8B-B14F-4D97-AF65-F5344CB8AC3E}">
+        <p14:creationId xmlns:p14="http://schemas.microsoft.com/office/powerpoint/2010/main" val="3050551614"/>
+      </p:ext>
+    </p:extLst>
+  </p:cSld>
+  <p:clrMapOvr>
+    <a:masterClrMapping/>
+  </p:clrMapOvr>
+</p:notes>
+</file>
+
+<file path=ppt/notesSlides/notesSlide21.xml><?xml version="1.0" encoding="utf-8"?>
+<p:notes xmlns:a="http://schemas.openxmlformats.org/drawingml/2006/main" xmlns:r="http://schemas.openxmlformats.org/officeDocument/2006/relationships" xmlns:p="http://schemas.openxmlformats.org/presentationml/2006/main">
+  <p:cSld>
+    <p:spTree>
+      <p:nvGrpSpPr>
+        <p:cNvPr id="1" name=""/>
+        <p:cNvGrpSpPr/>
+        <p:nvPr/>
+      </p:nvGrpSpPr>
+      <p:grpSpPr>
+        <a:xfrm>
+          <a:off x="0" y="0"/>
+          <a:ext cx="0" cy="0"/>
+          <a:chOff x="0" y="0"/>
+          <a:chExt cx="0" cy="0"/>
+        </a:xfrm>
+      </p:grpSpPr>
+      <p:sp>
+        <p:nvSpPr>
+          <p:cNvPr id="2" name="Slide Image Placeholder 1"/>
+          <p:cNvSpPr>
+            <a:spLocks noGrp="1" noRot="1" noChangeAspect="1"/>
+          </p:cNvSpPr>
+          <p:nvPr>
+            <p:ph type="sldImg"/>
+          </p:nvPr>
+        </p:nvSpPr>
+        <p:spPr/>
+      </p:sp>
+      <p:sp>
+        <p:nvSpPr>
+          <p:cNvPr id="3" name="Notes Placeholder 2"/>
+          <p:cNvSpPr>
+            <a:spLocks noGrp="1"/>
+          </p:cNvSpPr>
+          <p:nvPr>
+            <p:ph type="body" idx="1"/>
+          </p:nvPr>
+        </p:nvSpPr>
+        <p:spPr/>
+        <p:txBody>
+          <a:bodyPr/>
+          <a:lstStyle/>
+          <a:p>
+            <a:pPr marL="0" indent="0">
+              <a:buFontTx/>
+              <a:buNone/>
+            </a:pPr>
+            <a:endParaRPr lang="en-US" baseline="0" dirty="0" smtClean="0"/>
+          </a:p>
+        </p:txBody>
+      </p:sp>
+      <p:sp>
+        <p:nvSpPr>
+          <p:cNvPr id="4" name="Slide Number Placeholder 3"/>
+          <p:cNvSpPr>
+            <a:spLocks noGrp="1"/>
+          </p:cNvSpPr>
+          <p:nvPr>
+            <p:ph type="sldNum" sz="quarter" idx="10"/>
+          </p:nvPr>
+        </p:nvSpPr>
+        <p:spPr/>
+        <p:txBody>
+          <a:bodyPr/>
+          <a:lstStyle/>
+          <a:p>
+            <a:fld id="{48F5F6DF-9BE4-4641-AC70-C633D8EF56D7}" type="slidenum">
+              <a:rPr lang="en-US" smtClean="0"/>
+              <a:t>25</a:t>
             </a:fld>
             <a:endParaRPr lang="en-US"/>
           </a:p>
@@ -2900,7 +2988,7 @@
           <a:p>
             <a:fld id="{03F65E02-F4FE-41A5-B9C5-4E8AE5AF45AA}" type="datetimeFigureOut">
               <a:rPr lang="en-US" smtClean="0"/>
-              <a:t>4/21/2018</a:t>
+              <a:t>4/24/2018</a:t>
             </a:fld>
             <a:endParaRPr lang="en-US"/>
           </a:p>
@@ -3070,7 +3158,7 @@
           <a:p>
             <a:fld id="{03F65E02-F4FE-41A5-B9C5-4E8AE5AF45AA}" type="datetimeFigureOut">
               <a:rPr lang="en-US" smtClean="0"/>
-              <a:t>4/21/2018</a:t>
+              <a:t>4/24/2018</a:t>
             </a:fld>
             <a:endParaRPr lang="en-US"/>
           </a:p>
@@ -3250,7 +3338,7 @@
           <a:p>
             <a:fld id="{03F65E02-F4FE-41A5-B9C5-4E8AE5AF45AA}" type="datetimeFigureOut">
               <a:rPr lang="en-US" smtClean="0"/>
-              <a:t>4/21/2018</a:t>
+              <a:t>4/24/2018</a:t>
             </a:fld>
             <a:endParaRPr lang="en-US"/>
           </a:p>
@@ -3420,7 +3508,7 @@
           <a:p>
             <a:fld id="{03F65E02-F4FE-41A5-B9C5-4E8AE5AF45AA}" type="datetimeFigureOut">
               <a:rPr lang="en-US" smtClean="0"/>
-              <a:t>4/21/2018</a:t>
+              <a:t>4/24/2018</a:t>
             </a:fld>
             <a:endParaRPr lang="en-US"/>
           </a:p>
@@ -3666,7 +3754,7 @@
           <a:p>
             <a:fld id="{03F65E02-F4FE-41A5-B9C5-4E8AE5AF45AA}" type="datetimeFigureOut">
               <a:rPr lang="en-US" smtClean="0"/>
-              <a:t>4/21/2018</a:t>
+              <a:t>4/24/2018</a:t>
             </a:fld>
             <a:endParaRPr lang="en-US"/>
           </a:p>
@@ -3954,7 +4042,7 @@
           <a:p>
             <a:fld id="{03F65E02-F4FE-41A5-B9C5-4E8AE5AF45AA}" type="datetimeFigureOut">
               <a:rPr lang="en-US" smtClean="0"/>
-              <a:t>4/21/2018</a:t>
+              <a:t>4/24/2018</a:t>
             </a:fld>
             <a:endParaRPr lang="en-US"/>
           </a:p>
@@ -4376,7 +4464,7 @@
           <a:p>
             <a:fld id="{03F65E02-F4FE-41A5-B9C5-4E8AE5AF45AA}" type="datetimeFigureOut">
               <a:rPr lang="en-US" smtClean="0"/>
-              <a:t>4/21/2018</a:t>
+              <a:t>4/24/2018</a:t>
             </a:fld>
             <a:endParaRPr lang="en-US"/>
           </a:p>
@@ -4494,7 +4582,7 @@
           <a:p>
             <a:fld id="{03F65E02-F4FE-41A5-B9C5-4E8AE5AF45AA}" type="datetimeFigureOut">
               <a:rPr lang="en-US" smtClean="0"/>
-              <a:t>4/21/2018</a:t>
+              <a:t>4/24/2018</a:t>
             </a:fld>
             <a:endParaRPr lang="en-US"/>
           </a:p>
@@ -4589,7 +4677,7 @@
           <a:p>
             <a:fld id="{03F65E02-F4FE-41A5-B9C5-4E8AE5AF45AA}" type="datetimeFigureOut">
               <a:rPr lang="en-US" smtClean="0"/>
-              <a:t>4/21/2018</a:t>
+              <a:t>4/24/2018</a:t>
             </a:fld>
             <a:endParaRPr lang="en-US"/>
           </a:p>
@@ -4866,7 +4954,7 @@
           <a:p>
             <a:fld id="{03F65E02-F4FE-41A5-B9C5-4E8AE5AF45AA}" type="datetimeFigureOut">
               <a:rPr lang="en-US" smtClean="0"/>
-              <a:t>4/21/2018</a:t>
+              <a:t>4/24/2018</a:t>
             </a:fld>
             <a:endParaRPr lang="en-US"/>
           </a:p>
@@ -5119,7 +5207,7 @@
           <a:p>
             <a:fld id="{03F65E02-F4FE-41A5-B9C5-4E8AE5AF45AA}" type="datetimeFigureOut">
               <a:rPr lang="en-US" smtClean="0"/>
-              <a:t>4/21/2018</a:t>
+              <a:t>4/24/2018</a:t>
             </a:fld>
             <a:endParaRPr lang="en-US"/>
           </a:p>
@@ -5332,7 +5420,7 @@
           <a:p>
             <a:fld id="{03F65E02-F4FE-41A5-B9C5-4E8AE5AF45AA}" type="datetimeFigureOut">
               <a:rPr lang="en-US" smtClean="0"/>
-              <a:t>4/21/2018</a:t>
+              <a:t>4/24/2018</a:t>
             </a:fld>
             <a:endParaRPr lang="en-US"/>
           </a:p>
@@ -6168,7 +6256,6 @@
               <a:rPr lang="en-US" sz="4800" dirty="0"/>
               <a:t>The Language</a:t>
             </a:r>
-            <a:endParaRPr lang="en-US" sz="4800" dirty="0"/>
           </a:p>
         </p:txBody>
       </p:sp>
@@ -7424,7 +7511,6 @@
               <a:rPr lang="en-US" sz="4800" dirty="0"/>
               <a:t>The Language</a:t>
             </a:r>
-            <a:endParaRPr lang="en-US" sz="4800" dirty="0"/>
           </a:p>
         </p:txBody>
       </p:sp>
@@ -7683,7 +7769,6 @@
               <a:rPr lang="en-US" sz="4800" dirty="0"/>
               <a:t>The Language</a:t>
             </a:r>
-            <a:endParaRPr lang="en-US" sz="4800" dirty="0"/>
           </a:p>
         </p:txBody>
       </p:sp>
@@ -7867,7 +7952,6 @@
               <a:rPr lang="en-US" sz="4800" dirty="0"/>
               <a:t>The Language</a:t>
             </a:r>
-            <a:endParaRPr lang="en-US" sz="4800" dirty="0"/>
           </a:p>
         </p:txBody>
       </p:sp>
@@ -8179,7 +8263,6 @@
               <a:rPr lang="en-US" sz="4800" dirty="0"/>
               <a:t>The Language</a:t>
             </a:r>
-            <a:endParaRPr lang="en-US" sz="4800" dirty="0"/>
           </a:p>
         </p:txBody>
       </p:sp>
@@ -8340,7 +8423,6 @@
               <a:rPr lang="en-US" sz="4800" dirty="0"/>
               <a:t>The Language</a:t>
             </a:r>
-            <a:endParaRPr lang="en-US" sz="4800" dirty="0"/>
           </a:p>
         </p:txBody>
       </p:sp>
@@ -8541,7 +8623,6 @@
               <a:rPr lang="en-US" sz="4800" dirty="0"/>
               <a:t>The Language</a:t>
             </a:r>
-            <a:endParaRPr lang="en-US" sz="4800" dirty="0"/>
           </a:p>
         </p:txBody>
       </p:sp>
@@ -8846,7 +8927,6 @@
               <a:rPr lang="en-US" sz="4800" dirty="0"/>
               <a:t>The Language</a:t>
             </a:r>
-            <a:endParaRPr lang="en-US" sz="4800" dirty="0"/>
           </a:p>
         </p:txBody>
       </p:sp>
@@ -9007,7 +9087,6 @@
               <a:rPr lang="en-US" sz="4800" dirty="0"/>
               <a:t>The Language</a:t>
             </a:r>
-            <a:endParaRPr lang="en-US" sz="4800" dirty="0"/>
           </a:p>
         </p:txBody>
       </p:sp>
@@ -9242,14 +9321,12 @@
               <a:rPr lang="en-US" dirty="0" smtClean="0"/>
               <a:t>Language encourages standard structure</a:t>
             </a:r>
-            <a:endParaRPr lang="en-US" dirty="0" smtClean="0"/>
           </a:p>
           <a:p>
             <a:r>
               <a:rPr lang="en-US" dirty="0" smtClean="0"/>
               <a:t>Weaknesses</a:t>
             </a:r>
-            <a:endParaRPr lang="en-US" dirty="0" smtClean="0"/>
           </a:p>
           <a:p>
             <a:pPr lvl="1"/>
@@ -9271,7 +9348,6 @@
               <a:rPr lang="en-US" dirty="0" smtClean="0"/>
               <a:t>Piecewise function definition can be abused</a:t>
             </a:r>
-            <a:endParaRPr lang="en-US" dirty="0" smtClean="0"/>
           </a:p>
           <a:p>
             <a:endParaRPr lang="en-US" dirty="0" smtClean="0"/>
@@ -9321,7 +9397,6 @@
               <a:rPr lang="en-US" sz="3600" dirty="0"/>
               <a:t>Readability / Writability</a:t>
             </a:r>
-            <a:endParaRPr lang="en-US" sz="3600" dirty="0"/>
           </a:p>
         </p:txBody>
       </p:sp>
@@ -9434,14 +9509,12 @@
               <a:rPr lang="en-US" dirty="0" smtClean="0"/>
               <a:t>Error handling approach</a:t>
             </a:r>
-            <a:endParaRPr lang="en-US" dirty="0" smtClean="0"/>
           </a:p>
           <a:p>
             <a:r>
               <a:rPr lang="en-US" dirty="0" smtClean="0"/>
               <a:t>Weaknesses</a:t>
             </a:r>
-            <a:endParaRPr lang="en-US" dirty="0" smtClean="0"/>
           </a:p>
           <a:p>
             <a:pPr lvl="1"/>
@@ -9456,7 +9529,6 @@
               <a:rPr lang="en-US" dirty="0" smtClean="0"/>
               <a:t>All or nothing security</a:t>
             </a:r>
-            <a:endParaRPr lang="en-US" dirty="0" smtClean="0"/>
           </a:p>
           <a:p>
             <a:pPr lvl="1"/>
@@ -9631,14 +9703,12 @@
               <a:rPr lang="en-US" dirty="0" smtClean="0"/>
               <a:t>Concurrency + distributed = massively scalable</a:t>
             </a:r>
-            <a:endParaRPr lang="en-US" dirty="0" smtClean="0"/>
           </a:p>
           <a:p>
             <a:r>
               <a:rPr lang="en-US" dirty="0" smtClean="0"/>
               <a:t>Weaknesses</a:t>
             </a:r>
-            <a:endParaRPr lang="en-US" dirty="0" smtClean="0"/>
           </a:p>
           <a:p>
             <a:pPr lvl="1"/>
@@ -9722,6 +9792,157 @@
     <p:extLst>
       <p:ext uri="{BB962C8B-B14F-4D97-AF65-F5344CB8AC3E}">
         <p14:creationId xmlns:p14="http://schemas.microsoft.com/office/powerpoint/2010/main" val="2292143024"/>
+      </p:ext>
+    </p:extLst>
+  </p:cSld>
+  <p:clrMapOvr>
+    <a:masterClrMapping/>
+  </p:clrMapOvr>
+</p:sld>
+</file>
+
+<file path=ppt/slides/slide25.xml><?xml version="1.0" encoding="utf-8"?>
+<p:sld xmlns:a="http://schemas.openxmlformats.org/drawingml/2006/main" xmlns:r="http://schemas.openxmlformats.org/officeDocument/2006/relationships" xmlns:p="http://schemas.openxmlformats.org/presentationml/2006/main">
+  <p:cSld>
+    <p:spTree>
+      <p:nvGrpSpPr>
+        <p:cNvPr id="1" name=""/>
+        <p:cNvGrpSpPr/>
+        <p:nvPr/>
+      </p:nvGrpSpPr>
+      <p:grpSpPr>
+        <a:xfrm>
+          <a:off x="0" y="0"/>
+          <a:ext cx="0" cy="0"/>
+          <a:chOff x="0" y="0"/>
+          <a:chExt cx="0" cy="0"/>
+        </a:xfrm>
+      </p:grpSpPr>
+      <p:sp>
+        <p:nvSpPr>
+          <p:cNvPr id="2" name="Title 1"/>
+          <p:cNvSpPr>
+            <a:spLocks noGrp="1"/>
+          </p:cNvSpPr>
+          <p:nvPr>
+            <p:ph type="title"/>
+          </p:nvPr>
+        </p:nvSpPr>
+        <p:spPr>
+          <a:xfrm>
+            <a:off x="457200" y="274638"/>
+            <a:ext cx="8229600" cy="563562"/>
+          </a:xfrm>
+        </p:spPr>
+        <p:txBody>
+          <a:bodyPr>
+            <a:noAutofit/>
+          </a:bodyPr>
+          <a:lstStyle/>
+          <a:p>
+            <a:r>
+              <a:rPr lang="en-US" sz="4800" dirty="0" smtClean="0"/>
+              <a:t>Standard References</a:t>
+            </a:r>
+            <a:endParaRPr lang="en-US" sz="4800" dirty="0"/>
+          </a:p>
+        </p:txBody>
+      </p:sp>
+      <p:sp>
+        <p:nvSpPr>
+          <p:cNvPr id="3" name="Content Placeholder 2"/>
+          <p:cNvSpPr>
+            <a:spLocks noGrp="1"/>
+          </p:cNvSpPr>
+          <p:nvPr>
+            <p:ph idx="1"/>
+          </p:nvPr>
+        </p:nvSpPr>
+        <p:spPr>
+          <a:xfrm>
+            <a:off x="457200" y="990600"/>
+            <a:ext cx="8229600" cy="5135563"/>
+          </a:xfrm>
+        </p:spPr>
+        <p:txBody>
+          <a:bodyPr>
+            <a:normAutofit/>
+          </a:bodyPr>
+          <a:lstStyle/>
+          <a:p>
+            <a:pPr lvl="0"/>
+            <a:r>
+              <a:rPr lang="en-US" sz="2000" dirty="0"/>
+              <a:t>Joe Armstrong. </a:t>
+            </a:r>
+            <a:r>
+              <a:rPr lang="en-US" sz="2000" i="1" dirty="0"/>
+              <a:t>Programming Erlang: Software for a Concurrent World</a:t>
+            </a:r>
+            <a:r>
+              <a:rPr lang="en-US" sz="2000" dirty="0"/>
+              <a:t>. Pragmatic Programmers LLC, 2013.</a:t>
+            </a:r>
+          </a:p>
+          <a:p>
+            <a:pPr lvl="0"/>
+            <a:r>
+              <a:rPr lang="en-US" sz="2000" dirty="0"/>
+              <a:t>Joe Armstrong. “A History of Erlang.” 19 Mar. 2018, http://webcem01.cem.itesm.mx:8005/erlang/cd/downloads/hopl_erlang.pdf.</a:t>
+            </a:r>
+          </a:p>
+          <a:p>
+            <a:pPr lvl="0"/>
+            <a:r>
+              <a:rPr lang="en-US" sz="2000" dirty="0"/>
+              <a:t>“An Erlang Course.” Erlang/OTP unit at Ericsson, 2 Apr. 2018, https://www.erlang.org/course.</a:t>
+            </a:r>
+          </a:p>
+          <a:p>
+            <a:pPr lvl="0"/>
+            <a:r>
+              <a:rPr lang="en-US" sz="2000" dirty="0"/>
+              <a:t>Erlang Homepage. Erlang/OTP unit at Ericsson, 2 Apr. 2018, https://www.erlang.org.</a:t>
+            </a:r>
+          </a:p>
+          <a:p>
+            <a:pPr lvl="0"/>
+            <a:r>
+              <a:rPr lang="en-US" sz="2000" dirty="0"/>
+              <a:t>“Documentation.” Erlang/OTP unit at Ericsson, 2 Apr. 2018, https://www.erlang.org/docs</a:t>
+            </a:r>
+          </a:p>
+          <a:p>
+            <a:pPr lvl="0"/>
+            <a:r>
+              <a:rPr lang="en-US" sz="2000" dirty="0"/>
+              <a:t>“Erlang (programming language).” Wikipedia, 11 Mar. 2018, https://en.wikipedia.org/wiki/Erlang_(programming_language).</a:t>
+            </a:r>
+          </a:p>
+          <a:p>
+            <a:r>
+              <a:rPr lang="en-US" sz="2000" dirty="0"/>
+              <a:t>“History of Erlang.” Wikipedia, 12 Mar. 2018, https://www.erlang.org/course/history.</a:t>
+            </a:r>
+            <a:endParaRPr lang="en-US" sz="2000" dirty="0" smtClean="0"/>
+          </a:p>
+          <a:p>
+            <a:pPr lvl="1"/>
+            <a:endParaRPr lang="en-US" dirty="0" smtClean="0"/>
+          </a:p>
+          <a:p>
+            <a:pPr lvl="1"/>
+            <a:endParaRPr lang="en-US" dirty="0" smtClean="0"/>
+          </a:p>
+          <a:p>
+            <a:endParaRPr lang="en-US" dirty="0" smtClean="0"/>
+          </a:p>
+        </p:txBody>
+      </p:sp>
+    </p:spTree>
+    <p:extLst>
+      <p:ext uri="{BB962C8B-B14F-4D97-AF65-F5344CB8AC3E}">
+        <p14:creationId xmlns:p14="http://schemas.microsoft.com/office/powerpoint/2010/main" val="1080479391"/>
       </p:ext>
     </p:extLst>
   </p:cSld>

</xml_diff>